<commit_message>
små rettelser logo etc.
</commit_message>
<xml_diff>
--- a/præsentation/presentation_template.pptx
+++ b/præsentation/presentation_template.pptx
@@ -313,6 +313,11 @@
       </a:defRPr>
     </a:lvl9pPr>
   </p:defaultTextStyle>
+  <p:extLst>
+    <p:ext uri="{EFAFB233-063F-42B5-8137-9DF3F51BA10A}">
+      <p15:sldGuideLst xmlns:p15="http://schemas.microsoft.com/office/powerpoint/2012/main"/>
+    </p:ext>
+  </p:extLst>
 </p:presentation>
 </file>
 
@@ -893,11 +898,11 @@
         </c:dLbls>
         <c:gapWidth val="40"/>
         <c:overlap val="-10"/>
-        <c:axId val="-1584237360"/>
-        <c:axId val="-1584236816"/>
+        <c:axId val="818088256"/>
+        <c:axId val="818089344"/>
       </c:barChart>
       <c:catAx>
-        <c:axId val="-1584237360"/>
+        <c:axId val="818088256"/>
         <c:scaling>
           <c:orientation val="minMax"/>
         </c:scaling>
@@ -931,7 +936,7 @@
             <a:endParaRPr lang="da-DK"/>
           </a:p>
         </c:txPr>
-        <c:crossAx val="-1584236816"/>
+        <c:crossAx val="818089344"/>
         <c:crosses val="autoZero"/>
         <c:auto val="1"/>
         <c:lblAlgn val="ctr"/>
@@ -939,7 +944,7 @@
         <c:noMultiLvlLbl val="1"/>
       </c:catAx>
       <c:valAx>
-        <c:axId val="-1584236816"/>
+        <c:axId val="818089344"/>
         <c:scaling>
           <c:orientation val="minMax"/>
         </c:scaling>
@@ -982,7 +987,7 @@
             <a:endParaRPr lang="da-DK"/>
           </a:p>
         </c:txPr>
-        <c:crossAx val="-1584237360"/>
+        <c:crossAx val="818088256"/>
         <c:crosses val="autoZero"/>
         <c:crossBetween val="between"/>
         <c:majorUnit val="25"/>
@@ -1591,11 +1596,11 @@
         </c:dLbls>
         <c:gapWidth val="40"/>
         <c:overlap val="-10"/>
-        <c:axId val="-1585212800"/>
-        <c:axId val="-1497241088"/>
+        <c:axId val="818099136"/>
+        <c:axId val="818094784"/>
       </c:barChart>
       <c:catAx>
-        <c:axId val="-1585212800"/>
+        <c:axId val="818099136"/>
         <c:scaling>
           <c:orientation val="minMax"/>
         </c:scaling>
@@ -1629,7 +1634,7 @@
             <a:endParaRPr lang="da-DK"/>
           </a:p>
         </c:txPr>
-        <c:crossAx val="-1497241088"/>
+        <c:crossAx val="818094784"/>
         <c:crosses val="autoZero"/>
         <c:auto val="1"/>
         <c:lblAlgn val="ctr"/>
@@ -1637,7 +1642,7 @@
         <c:noMultiLvlLbl val="1"/>
       </c:catAx>
       <c:valAx>
-        <c:axId val="-1497241088"/>
+        <c:axId val="818094784"/>
         <c:scaling>
           <c:orientation val="minMax"/>
         </c:scaling>
@@ -1680,7 +1685,7 @@
             <a:endParaRPr lang="da-DK"/>
           </a:p>
         </c:txPr>
-        <c:crossAx val="-1585212800"/>
+        <c:crossAx val="818099136"/>
         <c:crosses val="autoZero"/>
         <c:crossBetween val="between"/>
         <c:majorUnit val="25"/>
@@ -5734,7 +5739,7 @@
           </a:ln>
           <a:extLst>
             <a:ext uri="{C572A759-6A51-4108-AA02-DFA0A04FC94B}">
-              <ma14:wrappingTextBoxFlag xmlns:ma14="http://schemas.microsoft.com/office/mac/drawingml/2011/main" xmlns="" val="1"/>
+              <ma14:wrappingTextBoxFlag xmlns="" xmlns:ma14="http://schemas.microsoft.com/office/mac/drawingml/2011/main" val="1"/>
             </a:ext>
           </a:extLst>
         </p:spPr>
@@ -8690,7 +8695,7 @@
           </a:ln>
           <a:extLst>
             <a:ext uri="{C572A759-6A51-4108-AA02-DFA0A04FC94B}">
-              <ma14:wrappingTextBoxFlag xmlns:ma14="http://schemas.microsoft.com/office/mac/drawingml/2011/main" xmlns="" val="1"/>
+              <ma14:wrappingTextBoxFlag xmlns="" xmlns:ma14="http://schemas.microsoft.com/office/mac/drawingml/2011/main" val="1"/>
             </a:ext>
           </a:extLst>
         </p:spPr>
@@ -9399,7 +9404,7 @@
           </a:ln>
           <a:extLst>
             <a:ext uri="{C572A759-6A51-4108-AA02-DFA0A04FC94B}">
-              <ma14:wrappingTextBoxFlag xmlns:ma14="http://schemas.microsoft.com/office/mac/drawingml/2011/main" xmlns="" val="1"/>
+              <ma14:wrappingTextBoxFlag xmlns="" xmlns:ma14="http://schemas.microsoft.com/office/mac/drawingml/2011/main" val="1"/>
             </a:ext>
           </a:extLst>
         </p:spPr>
@@ -9438,7 +9443,7 @@
           </a:ln>
           <a:extLst>
             <a:ext uri="{C572A759-6A51-4108-AA02-DFA0A04FC94B}">
-              <ma14:wrappingTextBoxFlag xmlns:ma14="http://schemas.microsoft.com/office/mac/drawingml/2011/main" xmlns="" val="1"/>
+              <ma14:wrappingTextBoxFlag xmlns="" xmlns:ma14="http://schemas.microsoft.com/office/mac/drawingml/2011/main" val="1"/>
             </a:ext>
           </a:extLst>
         </p:spPr>
@@ -10404,7 +10409,7 @@
         </p:nvSpPr>
         <p:spPr>
           <a:xfrm>
-            <a:off x="7366000" y="3628241"/>
+            <a:off x="1120391" y="8276441"/>
             <a:ext cx="5638800" cy="687368"/>
           </a:xfrm>
           <a:prstGeom prst="rect">
@@ -10516,7 +10521,7 @@
         </p:nvSpPr>
         <p:spPr>
           <a:xfrm>
-            <a:off x="7543800" y="726602"/>
+            <a:off x="8318500" y="1564802"/>
             <a:ext cx="4686300" cy="2349361"/>
           </a:xfrm>
           <a:prstGeom prst="rect">
@@ -10950,7 +10955,7 @@
           </a:ln>
           <a:extLst>
             <a:ext uri="{C572A759-6A51-4108-AA02-DFA0A04FC94B}">
-              <ma14:wrappingTextBoxFlag xmlns:ma14="http://schemas.microsoft.com/office/mac/drawingml/2011/main" xmlns="" val="1"/>
+              <ma14:wrappingTextBoxFlag xmlns="" xmlns:ma14="http://schemas.microsoft.com/office/mac/drawingml/2011/main" val="1"/>
             </a:ext>
           </a:extLst>
         </p:spPr>
@@ -11056,7 +11061,7 @@
         </p:nvSpPr>
         <p:spPr>
           <a:xfrm>
-            <a:off x="5015547" y="2539999"/>
+            <a:off x="5034597" y="1301749"/>
             <a:ext cx="2973706" cy="1422401"/>
           </a:xfrm>
           <a:prstGeom prst="rect">
@@ -11067,7 +11072,7 @@
           </a:ln>
           <a:extLst>
             <a:ext uri="{C572A759-6A51-4108-AA02-DFA0A04FC94B}">
-              <ma14:wrappingTextBoxFlag xmlns:ma14="http://schemas.microsoft.com/office/mac/drawingml/2011/main" xmlns="" val="1"/>
+              <ma14:wrappingTextBoxFlag xmlns="" xmlns:ma14="http://schemas.microsoft.com/office/mac/drawingml/2011/main" val="1"/>
             </a:ext>
           </a:extLst>
         </p:spPr>
@@ -11079,14 +11084,206 @@
           <a:p>
             <a:pPr algn="ctr"/>
             <a:r>
+              <a:rPr dirty="0"/>
               <a:t>What we did</a:t>
             </a:r>
           </a:p>
           <a:p>
             <a:pPr algn="ctr"/>
             <a:r>
+              <a:rPr dirty="0"/>
               <a:t>and how</a:t>
             </a:r>
+          </a:p>
+        </p:txBody>
+      </p:sp>
+      <p:sp>
+        <p:nvSpPr>
+          <p:cNvPr id="2" name="Tekstfelt 1"/>
+          <p:cNvSpPr txBox="1"/>
+          <p:nvPr/>
+        </p:nvSpPr>
+        <p:spPr>
+          <a:xfrm>
+            <a:off x="1619250" y="3229354"/>
+            <a:ext cx="10896600" cy="4780796"/>
+          </a:xfrm>
+          <a:prstGeom prst="rect">
+            <a:avLst/>
+          </a:prstGeom>
+          <a:noFill/>
+          <a:ln w="12700" cap="flat">
+            <a:noFill/>
+            <a:miter lim="400000"/>
+          </a:ln>
+          <a:effectLst/>
+          <a:sp3d/>
+        </p:spPr>
+        <p:style>
+          <a:lnRef idx="0">
+            <a:scrgbClr r="0" g="0" b="0"/>
+          </a:lnRef>
+          <a:fillRef idx="0">
+            <a:scrgbClr r="0" g="0" b="0"/>
+          </a:fillRef>
+          <a:effectRef idx="0">
+            <a:scrgbClr r="0" g="0" b="0"/>
+          </a:effectRef>
+          <a:fontRef idx="none"/>
+        </p:style>
+        <p:txBody>
+          <a:bodyPr rot="0" spcFirstLastPara="1" vertOverflow="overflow" horzOverflow="overflow" vert="horz" wrap="square" lIns="50800" tIns="50800" rIns="50800" bIns="50800" numCol="1" spcCol="38100" rtlCol="0" anchor="ctr">
+            <a:spAutoFit/>
+          </a:bodyPr>
+          <a:lstStyle/>
+          <a:p>
+            <a:pPr marL="571500" marR="0" indent="-571500" algn="l" defTabSz="584200" rtl="0" fontAlgn="auto" latinLnBrk="0" hangingPunct="0">
+              <a:lnSpc>
+                <a:spcPct val="100000"/>
+              </a:lnSpc>
+              <a:spcBef>
+                <a:spcPts val="0"/>
+              </a:spcBef>
+              <a:spcAft>
+                <a:spcPts val="0"/>
+              </a:spcAft>
+              <a:buClrTx/>
+              <a:buSzTx/>
+              <a:buFont typeface="Arial" panose="020B0604020202020204" pitchFamily="34" charset="0"/>
+              <a:buChar char="•"/>
+              <a:tabLst/>
+            </a:pPr>
+            <a:r>
+              <a:rPr lang="en-US" dirty="0" smtClean="0"/>
+              <a:t>Started by viewing our objectives</a:t>
+            </a:r>
+          </a:p>
+          <a:p>
+            <a:pPr marL="571500" marR="0" indent="-571500" algn="l" defTabSz="584200" rtl="0" fontAlgn="auto" latinLnBrk="0" hangingPunct="0">
+              <a:lnSpc>
+                <a:spcPct val="100000"/>
+              </a:lnSpc>
+              <a:spcBef>
+                <a:spcPts val="0"/>
+              </a:spcBef>
+              <a:spcAft>
+                <a:spcPts val="0"/>
+              </a:spcAft>
+              <a:buClrTx/>
+              <a:buSzTx/>
+              <a:buFont typeface="Arial" panose="020B0604020202020204" pitchFamily="34" charset="0"/>
+              <a:buChar char="•"/>
+              <a:tabLst/>
+            </a:pPr>
+            <a:r>
+              <a:rPr lang="en-US" dirty="0" smtClean="0">
+                <a:sym typeface="Wingdings" panose="05000000000000000000" pitchFamily="2" charset="2"/>
+              </a:rPr>
+              <a:t></a:t>
+            </a:r>
+            <a:r>
+              <a:rPr lang="en-US" dirty="0" smtClean="0"/>
+              <a:t> Setting up a template for the site (&lt;header&gt;,&lt;</a:t>
+            </a:r>
+            <a:r>
+              <a:rPr lang="en-US" dirty="0" err="1" smtClean="0"/>
+              <a:t>nav</a:t>
+            </a:r>
+            <a:r>
+              <a:rPr lang="en-US" dirty="0" smtClean="0"/>
+              <a:t>&gt;,&lt;section&gt;, etc.)</a:t>
+            </a:r>
+          </a:p>
+          <a:p>
+            <a:pPr marL="571500" marR="0" indent="-571500" algn="l" defTabSz="584200" rtl="0" fontAlgn="auto" latinLnBrk="0" hangingPunct="0">
+              <a:lnSpc>
+                <a:spcPct val="100000"/>
+              </a:lnSpc>
+              <a:spcBef>
+                <a:spcPts val="0"/>
+              </a:spcBef>
+              <a:spcAft>
+                <a:spcPts val="0"/>
+              </a:spcAft>
+              <a:buClrTx/>
+              <a:buSzTx/>
+              <a:buFont typeface="Arial" panose="020B0604020202020204" pitchFamily="34" charset="0"/>
+              <a:buChar char="•"/>
+              <a:tabLst/>
+            </a:pPr>
+            <a:r>
+              <a:rPr lang="en-US" dirty="0" smtClean="0">
+                <a:sym typeface="Wingdings" panose="05000000000000000000" pitchFamily="2" charset="2"/>
+              </a:rPr>
+              <a:t> Filling in content</a:t>
+            </a:r>
+          </a:p>
+          <a:p>
+            <a:pPr marL="571500" marR="0" indent="-571500" algn="l" defTabSz="584200" rtl="0" fontAlgn="auto" latinLnBrk="0" hangingPunct="0">
+              <a:lnSpc>
+                <a:spcPct val="100000"/>
+              </a:lnSpc>
+              <a:spcBef>
+                <a:spcPts val="0"/>
+              </a:spcBef>
+              <a:spcAft>
+                <a:spcPts val="0"/>
+              </a:spcAft>
+              <a:buClrTx/>
+              <a:buSzTx/>
+              <a:buFont typeface="Arial" panose="020B0604020202020204" pitchFamily="34" charset="0"/>
+              <a:buChar char="•"/>
+              <a:tabLst/>
+            </a:pPr>
+            <a:r>
+              <a:rPr lang="en-US" dirty="0" smtClean="0">
+                <a:sym typeface="Wingdings" panose="05000000000000000000" pitchFamily="2" charset="2"/>
+              </a:rPr>
+              <a:t> Styling content</a:t>
+            </a:r>
+          </a:p>
+          <a:p>
+            <a:pPr marL="571500" marR="0" indent="-571500" algn="l" defTabSz="584200" rtl="0" fontAlgn="auto" latinLnBrk="0" hangingPunct="0">
+              <a:lnSpc>
+                <a:spcPct val="100000"/>
+              </a:lnSpc>
+              <a:spcBef>
+                <a:spcPts val="0"/>
+              </a:spcBef>
+              <a:spcAft>
+                <a:spcPts val="0"/>
+              </a:spcAft>
+              <a:buClrTx/>
+              <a:buSzTx/>
+              <a:buFont typeface="Arial" panose="020B0604020202020204" pitchFamily="34" charset="0"/>
+              <a:buChar char="•"/>
+              <a:tabLst/>
+            </a:pPr>
+            <a:r>
+              <a:rPr lang="en-US" dirty="0" smtClean="0">
+                <a:sym typeface="Wingdings" panose="05000000000000000000" pitchFamily="2" charset="2"/>
+              </a:rPr>
+              <a:t>Used GitHub throughout the process for easy collaboration</a:t>
+            </a:r>
+          </a:p>
+          <a:p>
+            <a:pPr marL="571500" marR="0" indent="-571500" algn="l" defTabSz="584200" rtl="0" fontAlgn="auto" latinLnBrk="0" hangingPunct="0">
+              <a:lnSpc>
+                <a:spcPct val="100000"/>
+              </a:lnSpc>
+              <a:spcBef>
+                <a:spcPts val="0"/>
+              </a:spcBef>
+              <a:spcAft>
+                <a:spcPts val="0"/>
+              </a:spcAft>
+              <a:buClrTx/>
+              <a:buSzTx/>
+              <a:buFont typeface="Arial" panose="020B0604020202020204" pitchFamily="34" charset="0"/>
+              <a:buChar char="•"/>
+              <a:tabLst/>
+            </a:pPr>
+            <a:endParaRPr lang="en-US" dirty="0" smtClean="0"/>
           </a:p>
         </p:txBody>
       </p:sp>
@@ -11124,8 +11321,8 @@
         </p:nvSpPr>
         <p:spPr>
           <a:xfrm>
-            <a:off x="4439081" y="2209800"/>
-            <a:ext cx="4126638" cy="2082801"/>
+            <a:off x="5914955" y="986640"/>
+            <a:ext cx="1402627" cy="687368"/>
           </a:xfrm>
           <a:prstGeom prst="rect">
             <a:avLst/>
@@ -11135,7 +11332,7 @@
           </a:ln>
           <a:extLst>
             <a:ext uri="{C572A759-6A51-4108-AA02-DFA0A04FC94B}">
-              <ma14:wrappingTextBoxFlag xmlns:ma14="http://schemas.microsoft.com/office/mac/drawingml/2011/main" xmlns="" val="1"/>
+              <ma14:wrappingTextBoxFlag xmlns="" xmlns:ma14="http://schemas.microsoft.com/office/mac/drawingml/2011/main" val="1"/>
             </a:ext>
           </a:extLst>
         </p:spPr>
@@ -11154,23 +11351,251 @@
               </a:defRPr>
             </a:pPr>
             <a:r>
+              <a:rPr dirty="0" smtClean="0"/>
               <a:t>Demo</a:t>
             </a:r>
-          </a:p>
-          <a:p>
-            <a:pPr algn="ctr"/>
+            <a:endParaRPr dirty="0"/>
+          </a:p>
+        </p:txBody>
+      </p:sp>
+      <p:sp>
+        <p:nvSpPr>
+          <p:cNvPr id="2" name="Tekstfelt 1"/>
+          <p:cNvSpPr txBox="1"/>
+          <p:nvPr/>
+        </p:nvSpPr>
+        <p:spPr>
+          <a:xfrm>
+            <a:off x="400050" y="2764354"/>
+            <a:ext cx="4152900" cy="1272143"/>
+          </a:xfrm>
+          <a:prstGeom prst="rect">
+            <a:avLst/>
+          </a:prstGeom>
+          <a:noFill/>
+          <a:ln w="12700" cap="flat">
+            <a:noFill/>
+            <a:miter lim="400000"/>
+          </a:ln>
+          <a:effectLst/>
+          <a:sp3d/>
+        </p:spPr>
+        <p:style>
+          <a:lnRef idx="0">
+            <a:scrgbClr r="0" g="0" b="0"/>
+          </a:lnRef>
+          <a:fillRef idx="0">
+            <a:scrgbClr r="0" g="0" b="0"/>
+          </a:fillRef>
+          <a:effectRef idx="0">
+            <a:scrgbClr r="0" g="0" b="0"/>
+          </a:effectRef>
+          <a:fontRef idx="none"/>
+        </p:style>
+        <p:txBody>
+          <a:bodyPr rot="0" spcFirstLastPara="1" vertOverflow="overflow" horzOverflow="overflow" vert="horz" wrap="square" lIns="50800" tIns="50800" rIns="50800" bIns="50800" numCol="1" spcCol="38100" rtlCol="0" anchor="ctr">
+            <a:spAutoFit/>
+          </a:bodyPr>
+          <a:lstStyle/>
+          <a:p>
             <a:r>
-              <a:t>How it was before</a:t>
+              <a:rPr lang="da-DK" dirty="0"/>
+              <a:t>How it </a:t>
             </a:r>
-          </a:p>
-          <a:p>
-            <a:pPr algn="ctr"/>
             <a:r>
-              <a:t>How it is now</a:t>
+              <a:rPr lang="da-DK" dirty="0" err="1"/>
+              <a:t>was</a:t>
             </a:r>
-          </a:p>
-        </p:txBody>
-      </p:sp>
+            <a:r>
+              <a:rPr lang="da-DK" dirty="0"/>
+              <a:t> </a:t>
+            </a:r>
+            <a:r>
+              <a:rPr lang="da-DK" dirty="0" err="1"/>
+              <a:t>before</a:t>
+            </a:r>
+            <a:endParaRPr lang="da-DK" dirty="0"/>
+          </a:p>
+          <a:p>
+            <a:pPr marL="0" marR="0" indent="0" algn="l" defTabSz="584200" rtl="0" fontAlgn="auto" latinLnBrk="0" hangingPunct="0">
+              <a:lnSpc>
+                <a:spcPct val="100000"/>
+              </a:lnSpc>
+              <a:spcBef>
+                <a:spcPts val="0"/>
+              </a:spcBef>
+              <a:spcAft>
+                <a:spcPts val="0"/>
+              </a:spcAft>
+              <a:buClrTx/>
+              <a:buSzTx/>
+              <a:buFontTx/>
+              <a:buNone/>
+              <a:tabLst/>
+            </a:pPr>
+            <a:endParaRPr kumimoji="0" lang="da-DK" sz="3800" b="0" i="0" u="none" strike="noStrike" cap="none" spc="0" normalizeH="0" baseline="0" dirty="0">
+              <a:ln>
+                <a:noFill/>
+              </a:ln>
+              <a:solidFill>
+                <a:srgbClr val="4E5755"/>
+              </a:solidFill>
+              <a:effectLst/>
+              <a:uFillTx/>
+              <a:latin typeface="+mn-lt"/>
+              <a:ea typeface="+mn-ea"/>
+              <a:cs typeface="+mn-cs"/>
+              <a:sym typeface="Avenir Book"/>
+            </a:endParaRPr>
+          </a:p>
+        </p:txBody>
+      </p:sp>
+      <p:sp>
+        <p:nvSpPr>
+          <p:cNvPr id="3" name="Tekstfelt 2"/>
+          <p:cNvSpPr txBox="1"/>
+          <p:nvPr/>
+        </p:nvSpPr>
+        <p:spPr>
+          <a:xfrm>
+            <a:off x="7943850" y="2764354"/>
+            <a:ext cx="5308600" cy="1272143"/>
+          </a:xfrm>
+          <a:prstGeom prst="rect">
+            <a:avLst/>
+          </a:prstGeom>
+          <a:noFill/>
+          <a:ln w="12700" cap="flat">
+            <a:noFill/>
+            <a:miter lim="400000"/>
+          </a:ln>
+          <a:effectLst/>
+          <a:sp3d/>
+        </p:spPr>
+        <p:style>
+          <a:lnRef idx="0">
+            <a:scrgbClr r="0" g="0" b="0"/>
+          </a:lnRef>
+          <a:fillRef idx="0">
+            <a:scrgbClr r="0" g="0" b="0"/>
+          </a:fillRef>
+          <a:effectRef idx="0">
+            <a:scrgbClr r="0" g="0" b="0"/>
+          </a:effectRef>
+          <a:fontRef idx="none"/>
+        </p:style>
+        <p:txBody>
+          <a:bodyPr rot="0" spcFirstLastPara="1" vertOverflow="overflow" horzOverflow="overflow" vert="horz" wrap="square" lIns="50800" tIns="50800" rIns="50800" bIns="50800" numCol="1" spcCol="38100" rtlCol="0" anchor="ctr">
+            <a:spAutoFit/>
+          </a:bodyPr>
+          <a:lstStyle/>
+          <a:p>
+            <a:r>
+              <a:rPr lang="da-DK" dirty="0"/>
+              <a:t>How it is </a:t>
+            </a:r>
+            <a:r>
+              <a:rPr lang="da-DK" dirty="0" err="1"/>
+              <a:t>now</a:t>
+            </a:r>
+            <a:endParaRPr lang="da-DK" dirty="0"/>
+          </a:p>
+          <a:p>
+            <a:pPr marL="0" marR="0" indent="0" algn="l" defTabSz="584200" rtl="0" fontAlgn="auto" latinLnBrk="0" hangingPunct="0">
+              <a:lnSpc>
+                <a:spcPct val="100000"/>
+              </a:lnSpc>
+              <a:spcBef>
+                <a:spcPts val="0"/>
+              </a:spcBef>
+              <a:spcAft>
+                <a:spcPts val="0"/>
+              </a:spcAft>
+              <a:buClrTx/>
+              <a:buSzTx/>
+              <a:buFontTx/>
+              <a:buNone/>
+              <a:tabLst/>
+            </a:pPr>
+            <a:endParaRPr kumimoji="0" lang="da-DK" sz="3800" b="0" i="0" u="none" strike="noStrike" cap="none" spc="0" normalizeH="0" baseline="0" dirty="0">
+              <a:ln>
+                <a:noFill/>
+              </a:ln>
+              <a:solidFill>
+                <a:srgbClr val="4E5755"/>
+              </a:solidFill>
+              <a:effectLst/>
+              <a:uFillTx/>
+              <a:latin typeface="+mn-lt"/>
+              <a:ea typeface="+mn-ea"/>
+              <a:cs typeface="+mn-cs"/>
+              <a:sym typeface="Avenir Book"/>
+            </a:endParaRPr>
+          </a:p>
+        </p:txBody>
+      </p:sp>
+      <p:pic>
+        <p:nvPicPr>
+          <p:cNvPr id="4" name="Billede 3">
+            <a:hlinkClick r:id="rId2"/>
+          </p:cNvPr>
+          <p:cNvPicPr>
+            <a:picLocks noChangeAspect="1"/>
+          </p:cNvPicPr>
+          <p:nvPr/>
+        </p:nvPicPr>
+        <p:blipFill>
+          <a:blip r:embed="rId3">
+            <a:extLst>
+              <a:ext uri="{28A0092B-C50C-407E-A947-70E740481C1C}">
+                <a14:useLocalDpi xmlns:a14="http://schemas.microsoft.com/office/drawing/2010/main" val="0"/>
+              </a:ext>
+            </a:extLst>
+          </a:blip>
+          <a:stretch>
+            <a:fillRect/>
+          </a:stretch>
+        </p:blipFill>
+        <p:spPr>
+          <a:xfrm>
+            <a:off x="0" y="3724275"/>
+            <a:ext cx="6285335" cy="3533775"/>
+          </a:xfrm>
+          <a:prstGeom prst="rect">
+            <a:avLst/>
+          </a:prstGeom>
+        </p:spPr>
+      </p:pic>
+      <p:pic>
+        <p:nvPicPr>
+          <p:cNvPr id="5" name="Billede 4"/>
+          <p:cNvPicPr>
+            <a:picLocks noChangeAspect="1"/>
+          </p:cNvPicPr>
+          <p:nvPr/>
+        </p:nvPicPr>
+        <p:blipFill>
+          <a:blip r:embed="rId4">
+            <a:extLst>
+              <a:ext uri="{28A0092B-C50C-407E-A947-70E740481C1C}">
+                <a14:useLocalDpi xmlns:a14="http://schemas.microsoft.com/office/drawing/2010/main" val="0"/>
+              </a:ext>
+            </a:extLst>
+          </a:blip>
+          <a:stretch>
+            <a:fillRect/>
+          </a:stretch>
+        </p:blipFill>
+        <p:spPr>
+          <a:xfrm>
+            <a:off x="6522877" y="3712255"/>
+            <a:ext cx="6306715" cy="3545795"/>
+          </a:xfrm>
+          <a:prstGeom prst="rect">
+            <a:avLst/>
+          </a:prstGeom>
+        </p:spPr>
+      </p:pic>
     </p:spTree>
   </p:cSld>
   <p:clrMapOvr>

</xml_diff>

<commit_message>
"Mobile friendly, you get what you pay for"
</commit_message>
<xml_diff>
--- a/præsentation/presentation_template.pptx
+++ b/præsentation/presentation_template.pptx
@@ -322,7 +322,7 @@
 </file>
 
 <file path=ppt/charts/chart1.xml><?xml version="1.0" encoding="utf-8"?>
-<c:chartSpace xmlns:c="http://schemas.openxmlformats.org/drawingml/2006/chart" xmlns:a="http://schemas.openxmlformats.org/drawingml/2006/main" xmlns:r="http://schemas.openxmlformats.org/officeDocument/2006/relationships">
+<c:chartSpace xmlns:c="http://schemas.openxmlformats.org/drawingml/2006/chart" xmlns:a="http://schemas.openxmlformats.org/drawingml/2006/main" xmlns:r="http://schemas.openxmlformats.org/officeDocument/2006/relationships" xmlns:c16r2="http://schemas.microsoft.com/office/drawing/2015/06/chart">
   <c:date1904 val="1"/>
   <c:lang val="da-DK"/>
   <c:roundedCorners val="0"/>
@@ -370,6 +370,11 @@
           <c:dPt>
             <c:idx val="0"/>
             <c:bubble3D val="0"/>
+            <c:extLst>
+              <c:ext xmlns:c16="http://schemas.microsoft.com/office/drawing/2014/chart" uri="{C3380CC4-5D6E-409C-BE32-E72D297353CC}">
+                <c16:uniqueId val="{00000000-3592-4474-BF53-30EB4C2F4D76}"/>
+              </c:ext>
+            </c:extLst>
           </c:dPt>
           <c:dPt>
             <c:idx val="1"/>
@@ -384,6 +389,11 @@
               </a:ln>
               <a:effectLst/>
             </c:spPr>
+            <c:extLst>
+              <c:ext xmlns:c16="http://schemas.microsoft.com/office/drawing/2014/chart" uri="{C3380CC4-5D6E-409C-BE32-E72D297353CC}">
+                <c16:uniqueId val="{00000002-3592-4474-BF53-30EB4C2F4D76}"/>
+              </c:ext>
+            </c:extLst>
           </c:dPt>
           <c:dPt>
             <c:idx val="2"/>
@@ -398,6 +408,11 @@
               </a:ln>
               <a:effectLst/>
             </c:spPr>
+            <c:extLst>
+              <c:ext xmlns:c16="http://schemas.microsoft.com/office/drawing/2014/chart" uri="{C3380CC4-5D6E-409C-BE32-E72D297353CC}">
+                <c16:uniqueId val="{00000004-3592-4474-BF53-30EB4C2F4D76}"/>
+              </c:ext>
+            </c:extLst>
           </c:dPt>
           <c:dPt>
             <c:idx val="3"/>
@@ -412,6 +427,11 @@
               </a:ln>
               <a:effectLst/>
             </c:spPr>
+            <c:extLst>
+              <c:ext xmlns:c16="http://schemas.microsoft.com/office/drawing/2014/chart" uri="{C3380CC4-5D6E-409C-BE32-E72D297353CC}">
+                <c16:uniqueId val="{00000006-3592-4474-BF53-30EB4C2F4D76}"/>
+              </c:ext>
+            </c:extLst>
           </c:dPt>
           <c:dPt>
             <c:idx val="4"/>
@@ -426,6 +446,11 @@
               </a:ln>
               <a:effectLst/>
             </c:spPr>
+            <c:extLst>
+              <c:ext xmlns:c16="http://schemas.microsoft.com/office/drawing/2014/chart" uri="{C3380CC4-5D6E-409C-BE32-E72D297353CC}">
+                <c16:uniqueId val="{00000008-3592-4474-BF53-30EB4C2F4D76}"/>
+              </c:ext>
+            </c:extLst>
           </c:dPt>
           <c:dPt>
             <c:idx val="5"/>
@@ -440,6 +465,11 @@
               </a:ln>
               <a:effectLst/>
             </c:spPr>
+            <c:extLst>
+              <c:ext xmlns:c16="http://schemas.microsoft.com/office/drawing/2014/chart" uri="{C3380CC4-5D6E-409C-BE32-E72D297353CC}">
+                <c16:uniqueId val="{0000000A-3592-4474-BF53-30EB4C2F4D76}"/>
+              </c:ext>
+            </c:extLst>
           </c:dPt>
           <c:dLbls>
             <c:dLbl>
@@ -468,6 +498,11 @@
               <c:showSerName val="0"/>
               <c:showPercent val="1"/>
               <c:showBubbleSize val="0"/>
+              <c:extLst>
+                <c:ext xmlns:c16="http://schemas.microsoft.com/office/drawing/2014/chart" uri="{C3380CC4-5D6E-409C-BE32-E72D297353CC}">
+                  <c16:uniqueId val="{00000000-3592-4474-BF53-30EB4C2F4D76}"/>
+                </c:ext>
+              </c:extLst>
             </c:dLbl>
             <c:dLbl>
               <c:idx val="1"/>
@@ -495,6 +530,11 @@
               <c:showSerName val="0"/>
               <c:showPercent val="1"/>
               <c:showBubbleSize val="0"/>
+              <c:extLst>
+                <c:ext xmlns:c16="http://schemas.microsoft.com/office/drawing/2014/chart" uri="{C3380CC4-5D6E-409C-BE32-E72D297353CC}">
+                  <c16:uniqueId val="{00000002-3592-4474-BF53-30EB4C2F4D76}"/>
+                </c:ext>
+              </c:extLst>
             </c:dLbl>
             <c:dLbl>
               <c:idx val="2"/>
@@ -522,6 +562,11 @@
               <c:showSerName val="0"/>
               <c:showPercent val="1"/>
               <c:showBubbleSize val="0"/>
+              <c:extLst>
+                <c:ext xmlns:c16="http://schemas.microsoft.com/office/drawing/2014/chart" uri="{C3380CC4-5D6E-409C-BE32-E72D297353CC}">
+                  <c16:uniqueId val="{00000004-3592-4474-BF53-30EB4C2F4D76}"/>
+                </c:ext>
+              </c:extLst>
             </c:dLbl>
             <c:dLbl>
               <c:idx val="3"/>
@@ -549,6 +594,11 @@
               <c:showSerName val="0"/>
               <c:showPercent val="1"/>
               <c:showBubbleSize val="0"/>
+              <c:extLst>
+                <c:ext xmlns:c16="http://schemas.microsoft.com/office/drawing/2014/chart" uri="{C3380CC4-5D6E-409C-BE32-E72D297353CC}">
+                  <c16:uniqueId val="{00000006-3592-4474-BF53-30EB4C2F4D76}"/>
+                </c:ext>
+              </c:extLst>
             </c:dLbl>
             <c:dLbl>
               <c:idx val="4"/>
@@ -576,6 +626,11 @@
               <c:showSerName val="0"/>
               <c:showPercent val="1"/>
               <c:showBubbleSize val="0"/>
+              <c:extLst>
+                <c:ext xmlns:c16="http://schemas.microsoft.com/office/drawing/2014/chart" uri="{C3380CC4-5D6E-409C-BE32-E72D297353CC}">
+                  <c16:uniqueId val="{00000008-3592-4474-BF53-30EB4C2F4D76}"/>
+                </c:ext>
+              </c:extLst>
             </c:dLbl>
             <c:dLbl>
               <c:idx val="5"/>
@@ -603,6 +658,11 @@
               <c:showSerName val="0"/>
               <c:showPercent val="1"/>
               <c:showBubbleSize val="0"/>
+              <c:extLst>
+                <c:ext xmlns:c16="http://schemas.microsoft.com/office/drawing/2014/chart" uri="{C3380CC4-5D6E-409C-BE32-E72D297353CC}">
+                  <c16:uniqueId val="{0000000A-3592-4474-BF53-30EB4C2F4D76}"/>
+                </c:ext>
+              </c:extLst>
             </c:dLbl>
             <c:numFmt formatCode="#,##0%" sourceLinked="0"/>
             <c:spPr>
@@ -692,6 +752,11 @@
               </c:numCache>
             </c:numRef>
           </c:val>
+          <c:extLst>
+            <c:ext xmlns:c16="http://schemas.microsoft.com/office/drawing/2014/chart" uri="{C3380CC4-5D6E-409C-BE32-E72D297353CC}">
+              <c16:uniqueId val="{0000000B-3592-4474-BF53-30EB4C2F4D76}"/>
+            </c:ext>
+          </c:extLst>
         </c:ser>
         <c:dLbls>
           <c:showLegendKey val="0"/>
@@ -731,7 +796,7 @@
 </file>
 
 <file path=ppt/charts/chart2.xml><?xml version="1.0" encoding="utf-8"?>
-<c:chartSpace xmlns:c="http://schemas.openxmlformats.org/drawingml/2006/chart" xmlns:a="http://schemas.openxmlformats.org/drawingml/2006/main" xmlns:r="http://schemas.openxmlformats.org/officeDocument/2006/relationships">
+<c:chartSpace xmlns:c="http://schemas.openxmlformats.org/drawingml/2006/chart" xmlns:a="http://schemas.openxmlformats.org/drawingml/2006/main" xmlns:r="http://schemas.openxmlformats.org/officeDocument/2006/relationships" xmlns:c16r2="http://schemas.microsoft.com/office/drawing/2015/06/chart">
   <c:date1904 val="1"/>
   <c:lang val="da-DK"/>
   <c:roundedCorners val="0"/>
@@ -820,6 +885,11 @@
               </c:numCache>
             </c:numRef>
           </c:val>
+          <c:extLst>
+            <c:ext xmlns:c16="http://schemas.microsoft.com/office/drawing/2014/chart" uri="{C3380CC4-5D6E-409C-BE32-E72D297353CC}">
+              <c16:uniqueId val="{00000000-D643-47A6-A477-F9C5EEB34C88}"/>
+            </c:ext>
+          </c:extLst>
         </c:ser>
         <c:ser>
           <c:idx val="1"/>
@@ -887,6 +957,11 @@
               </c:numCache>
             </c:numRef>
           </c:val>
+          <c:extLst>
+            <c:ext xmlns:c16="http://schemas.microsoft.com/office/drawing/2014/chart" uri="{C3380CC4-5D6E-409C-BE32-E72D297353CC}">
+              <c16:uniqueId val="{00000001-D643-47A6-A477-F9C5EEB34C88}"/>
+            </c:ext>
+          </c:extLst>
         </c:ser>
         <c:dLbls>
           <c:showLegendKey val="0"/>
@@ -1020,7 +1095,7 @@
 </file>
 
 <file path=ppt/charts/chart3.xml><?xml version="1.0" encoding="utf-8"?>
-<c:chartSpace xmlns:c="http://schemas.openxmlformats.org/drawingml/2006/chart" xmlns:a="http://schemas.openxmlformats.org/drawingml/2006/main" xmlns:r="http://schemas.openxmlformats.org/officeDocument/2006/relationships">
+<c:chartSpace xmlns:c="http://schemas.openxmlformats.org/drawingml/2006/chart" xmlns:a="http://schemas.openxmlformats.org/drawingml/2006/main" xmlns:r="http://schemas.openxmlformats.org/officeDocument/2006/relationships" xmlns:c16r2="http://schemas.microsoft.com/office/drawing/2015/06/chart">
   <c:date1904 val="1"/>
   <c:lang val="da-DK"/>
   <c:roundedCorners val="0"/>
@@ -1068,6 +1143,11 @@
           <c:dPt>
             <c:idx val="0"/>
             <c:bubble3D val="0"/>
+            <c:extLst>
+              <c:ext xmlns:c16="http://schemas.microsoft.com/office/drawing/2014/chart" uri="{C3380CC4-5D6E-409C-BE32-E72D297353CC}">
+                <c16:uniqueId val="{00000000-2B3A-4E1C-BB3B-24C873456E99}"/>
+              </c:ext>
+            </c:extLst>
           </c:dPt>
           <c:dPt>
             <c:idx val="1"/>
@@ -1082,6 +1162,11 @@
               </a:ln>
               <a:effectLst/>
             </c:spPr>
+            <c:extLst>
+              <c:ext xmlns:c16="http://schemas.microsoft.com/office/drawing/2014/chart" uri="{C3380CC4-5D6E-409C-BE32-E72D297353CC}">
+                <c16:uniqueId val="{00000002-2B3A-4E1C-BB3B-24C873456E99}"/>
+              </c:ext>
+            </c:extLst>
           </c:dPt>
           <c:dPt>
             <c:idx val="2"/>
@@ -1096,6 +1181,11 @@
               </a:ln>
               <a:effectLst/>
             </c:spPr>
+            <c:extLst>
+              <c:ext xmlns:c16="http://schemas.microsoft.com/office/drawing/2014/chart" uri="{C3380CC4-5D6E-409C-BE32-E72D297353CC}">
+                <c16:uniqueId val="{00000004-2B3A-4E1C-BB3B-24C873456E99}"/>
+              </c:ext>
+            </c:extLst>
           </c:dPt>
           <c:dPt>
             <c:idx val="3"/>
@@ -1110,6 +1200,11 @@
               </a:ln>
               <a:effectLst/>
             </c:spPr>
+            <c:extLst>
+              <c:ext xmlns:c16="http://schemas.microsoft.com/office/drawing/2014/chart" uri="{C3380CC4-5D6E-409C-BE32-E72D297353CC}">
+                <c16:uniqueId val="{00000006-2B3A-4E1C-BB3B-24C873456E99}"/>
+              </c:ext>
+            </c:extLst>
           </c:dPt>
           <c:dPt>
             <c:idx val="4"/>
@@ -1124,6 +1219,11 @@
               </a:ln>
               <a:effectLst/>
             </c:spPr>
+            <c:extLst>
+              <c:ext xmlns:c16="http://schemas.microsoft.com/office/drawing/2014/chart" uri="{C3380CC4-5D6E-409C-BE32-E72D297353CC}">
+                <c16:uniqueId val="{00000008-2B3A-4E1C-BB3B-24C873456E99}"/>
+              </c:ext>
+            </c:extLst>
           </c:dPt>
           <c:dPt>
             <c:idx val="5"/>
@@ -1138,6 +1238,11 @@
               </a:ln>
               <a:effectLst/>
             </c:spPr>
+            <c:extLst>
+              <c:ext xmlns:c16="http://schemas.microsoft.com/office/drawing/2014/chart" uri="{C3380CC4-5D6E-409C-BE32-E72D297353CC}">
+                <c16:uniqueId val="{0000000A-2B3A-4E1C-BB3B-24C873456E99}"/>
+              </c:ext>
+            </c:extLst>
           </c:dPt>
           <c:dLbls>
             <c:dLbl>
@@ -1166,6 +1271,11 @@
               <c:showSerName val="0"/>
               <c:showPercent val="1"/>
               <c:showBubbleSize val="0"/>
+              <c:extLst>
+                <c:ext xmlns:c16="http://schemas.microsoft.com/office/drawing/2014/chart" uri="{C3380CC4-5D6E-409C-BE32-E72D297353CC}">
+                  <c16:uniqueId val="{00000000-2B3A-4E1C-BB3B-24C873456E99}"/>
+                </c:ext>
+              </c:extLst>
             </c:dLbl>
             <c:dLbl>
               <c:idx val="1"/>
@@ -1193,6 +1303,11 @@
               <c:showSerName val="0"/>
               <c:showPercent val="1"/>
               <c:showBubbleSize val="0"/>
+              <c:extLst>
+                <c:ext xmlns:c16="http://schemas.microsoft.com/office/drawing/2014/chart" uri="{C3380CC4-5D6E-409C-BE32-E72D297353CC}">
+                  <c16:uniqueId val="{00000002-2B3A-4E1C-BB3B-24C873456E99}"/>
+                </c:ext>
+              </c:extLst>
             </c:dLbl>
             <c:dLbl>
               <c:idx val="2"/>
@@ -1220,6 +1335,11 @@
               <c:showSerName val="0"/>
               <c:showPercent val="1"/>
               <c:showBubbleSize val="0"/>
+              <c:extLst>
+                <c:ext xmlns:c16="http://schemas.microsoft.com/office/drawing/2014/chart" uri="{C3380CC4-5D6E-409C-BE32-E72D297353CC}">
+                  <c16:uniqueId val="{00000004-2B3A-4E1C-BB3B-24C873456E99}"/>
+                </c:ext>
+              </c:extLst>
             </c:dLbl>
             <c:dLbl>
               <c:idx val="3"/>
@@ -1247,6 +1367,11 @@
               <c:showSerName val="0"/>
               <c:showPercent val="1"/>
               <c:showBubbleSize val="0"/>
+              <c:extLst>
+                <c:ext xmlns:c16="http://schemas.microsoft.com/office/drawing/2014/chart" uri="{C3380CC4-5D6E-409C-BE32-E72D297353CC}">
+                  <c16:uniqueId val="{00000006-2B3A-4E1C-BB3B-24C873456E99}"/>
+                </c:ext>
+              </c:extLst>
             </c:dLbl>
             <c:dLbl>
               <c:idx val="4"/>
@@ -1274,6 +1399,11 @@
               <c:showSerName val="0"/>
               <c:showPercent val="1"/>
               <c:showBubbleSize val="0"/>
+              <c:extLst>
+                <c:ext xmlns:c16="http://schemas.microsoft.com/office/drawing/2014/chart" uri="{C3380CC4-5D6E-409C-BE32-E72D297353CC}">
+                  <c16:uniqueId val="{00000008-2B3A-4E1C-BB3B-24C873456E99}"/>
+                </c:ext>
+              </c:extLst>
             </c:dLbl>
             <c:dLbl>
               <c:idx val="5"/>
@@ -1301,6 +1431,11 @@
               <c:showSerName val="0"/>
               <c:showPercent val="1"/>
               <c:showBubbleSize val="0"/>
+              <c:extLst>
+                <c:ext xmlns:c16="http://schemas.microsoft.com/office/drawing/2014/chart" uri="{C3380CC4-5D6E-409C-BE32-E72D297353CC}">
+                  <c16:uniqueId val="{0000000A-2B3A-4E1C-BB3B-24C873456E99}"/>
+                </c:ext>
+              </c:extLst>
             </c:dLbl>
             <c:numFmt formatCode="#,##0%" sourceLinked="0"/>
             <c:spPr>
@@ -1390,6 +1525,11 @@
               </c:numCache>
             </c:numRef>
           </c:val>
+          <c:extLst>
+            <c:ext xmlns:c16="http://schemas.microsoft.com/office/drawing/2014/chart" uri="{C3380CC4-5D6E-409C-BE32-E72D297353CC}">
+              <c16:uniqueId val="{0000000B-2B3A-4E1C-BB3B-24C873456E99}"/>
+            </c:ext>
+          </c:extLst>
         </c:ser>
         <c:dLbls>
           <c:showLegendKey val="0"/>
@@ -1429,7 +1569,7 @@
 </file>
 
 <file path=ppt/charts/chart4.xml><?xml version="1.0" encoding="utf-8"?>
-<c:chartSpace xmlns:c="http://schemas.openxmlformats.org/drawingml/2006/chart" xmlns:a="http://schemas.openxmlformats.org/drawingml/2006/main" xmlns:r="http://schemas.openxmlformats.org/officeDocument/2006/relationships">
+<c:chartSpace xmlns:c="http://schemas.openxmlformats.org/drawingml/2006/chart" xmlns:a="http://schemas.openxmlformats.org/drawingml/2006/main" xmlns:r="http://schemas.openxmlformats.org/officeDocument/2006/relationships" xmlns:c16r2="http://schemas.microsoft.com/office/drawing/2015/06/chart">
   <c:date1904 val="1"/>
   <c:lang val="da-DK"/>
   <c:roundedCorners val="0"/>
@@ -1518,6 +1658,11 @@
               </c:numCache>
             </c:numRef>
           </c:val>
+          <c:extLst>
+            <c:ext xmlns:c16="http://schemas.microsoft.com/office/drawing/2014/chart" uri="{C3380CC4-5D6E-409C-BE32-E72D297353CC}">
+              <c16:uniqueId val="{00000000-B3B1-48D3-84E0-9715396FF4E6}"/>
+            </c:ext>
+          </c:extLst>
         </c:ser>
         <c:ser>
           <c:idx val="1"/>
@@ -1585,6 +1730,11 @@
               </c:numCache>
             </c:numRef>
           </c:val>
+          <c:extLst>
+            <c:ext xmlns:c16="http://schemas.microsoft.com/office/drawing/2014/chart" uri="{C3380CC4-5D6E-409C-BE32-E72D297353CC}">
+              <c16:uniqueId val="{00000001-B3B1-48D3-84E0-9715396FF4E6}"/>
+            </c:ext>
+          </c:extLst>
         </c:ser>
         <c:dLbls>
           <c:showLegendKey val="0"/>
@@ -5659,7 +5809,7 @@
           </a:ln>
           <a:extLst>
             <a:ext uri="{C572A759-6A51-4108-AA02-DFA0A04FC94B}">
-              <ma14:wrappingTextBoxFlag xmlns:ma14="http://schemas.microsoft.com/office/mac/drawingml/2011/main" xmlns="" val="1"/>
+              <ma14:wrappingTextBoxFlag xmlns="" xmlns:ma14="http://schemas.microsoft.com/office/mac/drawingml/2011/main" val="1"/>
             </a:ext>
           </a:extLst>
         </p:spPr>
@@ -8535,7 +8685,7 @@
           </a:ln>
           <a:extLst>
             <a:ext uri="{C572A759-6A51-4108-AA02-DFA0A04FC94B}">
-              <ma14:wrappingTextBoxFlag xmlns:ma14="http://schemas.microsoft.com/office/mac/drawingml/2011/main" xmlns="" val="1"/>
+              <ma14:wrappingTextBoxFlag xmlns="" xmlns:ma14="http://schemas.microsoft.com/office/mac/drawingml/2011/main" val="1"/>
             </a:ext>
           </a:extLst>
         </p:spPr>
@@ -9234,7 +9384,7 @@
           </a:ln>
           <a:extLst>
             <a:ext uri="{C572A759-6A51-4108-AA02-DFA0A04FC94B}">
-              <ma14:wrappingTextBoxFlag xmlns:ma14="http://schemas.microsoft.com/office/mac/drawingml/2011/main" xmlns="" val="1"/>
+              <ma14:wrappingTextBoxFlag xmlns="" xmlns:ma14="http://schemas.microsoft.com/office/mac/drawingml/2011/main" val="1"/>
             </a:ext>
           </a:extLst>
         </p:spPr>
@@ -9273,7 +9423,7 @@
           </a:ln>
           <a:extLst>
             <a:ext uri="{C572A759-6A51-4108-AA02-DFA0A04FC94B}">
-              <ma14:wrappingTextBoxFlag xmlns:ma14="http://schemas.microsoft.com/office/mac/drawingml/2011/main" xmlns="" val="1"/>
+              <ma14:wrappingTextBoxFlag xmlns="" xmlns:ma14="http://schemas.microsoft.com/office/mac/drawingml/2011/main" val="1"/>
             </a:ext>
           </a:extLst>
         </p:spPr>
@@ -10258,7 +10408,7 @@
               <a:tabLst/>
             </a:pPr>
             <a:r>
-              <a:rPr kumimoji="0" lang="da-DK" sz="3800" b="0" i="0" u="none" strike="noStrike" cap="none" spc="0" normalizeH="0" baseline="0" dirty="0" smtClean="0">
+              <a:rPr kumimoji="0" lang="da-DK" sz="3800" b="0" i="0" u="none" strike="noStrike" cap="none" spc="0" normalizeH="0" baseline="0" dirty="0">
                 <a:ln>
                   <a:noFill/>
                 </a:ln>
@@ -10272,7 +10422,7 @@
               <a:t>Slogan:</a:t>
             </a:r>
             <a:r>
-              <a:rPr kumimoji="0" lang="da-DK" sz="3800" b="0" i="0" u="none" strike="noStrike" cap="none" spc="0" normalizeH="0" dirty="0" smtClean="0">
+              <a:rPr kumimoji="0" lang="da-DK" sz="3800" b="0" i="0" u="none" strike="noStrike" cap="none" spc="0" normalizeH="0" dirty="0">
                 <a:ln>
                   <a:noFill/>
                 </a:ln>
@@ -10286,7 +10436,7 @@
               <a:t> </a:t>
             </a:r>
             <a:r>
-              <a:rPr kumimoji="0" lang="da-DK" sz="3800" b="0" i="0" u="none" strike="noStrike" cap="none" spc="0" normalizeH="0" baseline="0" dirty="0" smtClean="0">
+              <a:rPr kumimoji="0" lang="da-DK" sz="3800" b="0" i="0" u="none" strike="noStrike" cap="none" spc="0" normalizeH="0" baseline="0" dirty="0">
                 <a:ln>
                   <a:noFill/>
                 </a:ln>
@@ -10299,17 +10449,6 @@
               </a:rPr>
               <a:t>Money well spent</a:t>
             </a:r>
-            <a:endParaRPr kumimoji="0" lang="da-DK" sz="3800" b="0" i="0" u="none" strike="noStrike" cap="none" spc="0" normalizeH="0" baseline="0" dirty="0">
-              <a:ln>
-                <a:noFill/>
-              </a:ln>
-              <a:solidFill>
-                <a:schemeClr val="bg1"/>
-              </a:solidFill>
-              <a:effectLst/>
-              <a:uFillTx/>
-              <a:sym typeface="Avenir Book"/>
-            </a:endParaRPr>
           </a:p>
         </p:txBody>
       </p:sp>
@@ -10370,7 +10509,7 @@
               <a:tabLst/>
             </a:pPr>
             <a:r>
-              <a:rPr kumimoji="0" lang="en-US" sz="3800" b="0" i="0" u="none" strike="noStrike" cap="none" spc="0" normalizeH="0" baseline="0" dirty="0" smtClean="0">
+              <a:rPr kumimoji="0" lang="en-US" sz="3800" b="0" i="0" u="none" strike="noStrike" cap="none" spc="0" normalizeH="0" baseline="0" dirty="0">
                 <a:ln>
                   <a:noFill/>
                 </a:ln>
@@ -10405,7 +10544,7 @@
               <a:tabLst/>
             </a:pPr>
             <a:r>
-              <a:rPr kumimoji="0" lang="en-US" sz="3600" b="0" i="0" u="none" strike="noStrike" cap="none" spc="0" normalizeH="0" baseline="0" dirty="0" smtClean="0">
+              <a:rPr kumimoji="0" lang="en-US" sz="3600" b="0" i="0" u="none" strike="noStrike" cap="none" spc="0" normalizeH="0" baseline="0" dirty="0">
                 <a:ln>
                   <a:noFill/>
                 </a:ln>
@@ -10422,7 +10561,7 @@
               <a:t>We take</a:t>
             </a:r>
             <a:r>
-              <a:rPr kumimoji="0" lang="en-US" sz="3600" b="0" i="0" u="none" strike="noStrike" cap="none" spc="0" normalizeH="0" dirty="0" smtClean="0">
+              <a:rPr kumimoji="0" lang="en-US" sz="3600" b="0" i="0" u="none" strike="noStrike" cap="none" spc="0" normalizeH="0" dirty="0">
                 <a:ln>
                   <a:noFill/>
                 </a:ln>
@@ -10512,7 +10651,7 @@
               <a:tabLst/>
             </a:pPr>
             <a:r>
-              <a:rPr kumimoji="0" lang="da-DK" sz="2000" b="0" i="0" u="none" strike="noStrike" cap="none" spc="0" normalizeH="0" baseline="0" dirty="0" smtClean="0">
+              <a:rPr kumimoji="0" lang="da-DK" sz="2000" b="0" i="0" u="none" strike="noStrike" cap="none" spc="0" normalizeH="0" baseline="0" dirty="0">
                 <a:ln>
                   <a:noFill/>
                 </a:ln>
@@ -10529,7 +10668,7 @@
               <a:t>Emanuel</a:t>
             </a:r>
             <a:r>
-              <a:rPr kumimoji="0" lang="da-DK" sz="2000" b="0" i="0" u="none" strike="noStrike" cap="none" spc="0" normalizeH="0" dirty="0" smtClean="0">
+              <a:rPr kumimoji="0" lang="da-DK" sz="2000" b="0" i="0" u="none" strike="noStrike" cap="none" spc="0" normalizeH="0" dirty="0">
                 <a:ln>
                   <a:noFill/>
                 </a:ln>
@@ -10619,7 +10758,7 @@
           </a:ln>
           <a:extLst>
             <a:ext uri="{C572A759-6A51-4108-AA02-DFA0A04FC94B}">
-              <ma14:wrappingTextBoxFlag xmlns:ma14="http://schemas.microsoft.com/office/mac/drawingml/2011/main" xmlns="" val="1"/>
+              <ma14:wrappingTextBoxFlag xmlns="" xmlns:ma14="http://schemas.microsoft.com/office/mac/drawingml/2011/main" val="1"/>
             </a:ext>
           </a:extLst>
         </p:spPr>
@@ -10635,18 +10774,10 @@
                   <a:schemeClr val="bg1"/>
                 </a:solidFill>
               </a:rPr>
-              <a:t>What our client wanted us to </a:t>
+              <a:t>What our client wanted us to do</a:t>
             </a:r>
             <a:r>
-              <a:rPr i="1" dirty="0" smtClean="0">
-                <a:solidFill>
-                  <a:schemeClr val="bg1"/>
-                </a:solidFill>
-              </a:rPr>
-              <a:t>do</a:t>
-            </a:r>
-            <a:r>
-              <a:rPr lang="da-DK" i="1" dirty="0" smtClean="0">
+              <a:rPr lang="da-DK" i="1" dirty="0">
                 <a:solidFill>
                   <a:schemeClr val="bg1"/>
                 </a:solidFill>
@@ -10724,11 +10855,6 @@
               </a:rPr>
               <a:t>Menu on site instead of pdf</a:t>
             </a:r>
-            <a:endParaRPr lang="en-US" dirty="0">
-              <a:solidFill>
-                <a:schemeClr val="bg1"/>
-              </a:solidFill>
-            </a:endParaRPr>
           </a:p>
         </p:txBody>
       </p:sp>
@@ -10789,7 +10915,7 @@
           </a:ln>
           <a:extLst>
             <a:ext uri="{C572A759-6A51-4108-AA02-DFA0A04FC94B}">
-              <ma14:wrappingTextBoxFlag xmlns:ma14="http://schemas.microsoft.com/office/mac/drawingml/2011/main" xmlns="" val="1"/>
+              <ma14:wrappingTextBoxFlag xmlns="" xmlns:ma14="http://schemas.microsoft.com/office/mac/drawingml/2011/main" val="1"/>
             </a:ext>
           </a:extLst>
         </p:spPr>
@@ -10879,7 +11005,7 @@
               <a:tabLst/>
             </a:pPr>
             <a:r>
-              <a:rPr lang="en-US" dirty="0" smtClean="0">
+              <a:rPr lang="en-US" dirty="0">
                 <a:solidFill>
                   <a:srgbClr val="FFFFFF"/>
                 </a:solidFill>
@@ -10905,7 +11031,7 @@
               <a:tabLst/>
             </a:pPr>
             <a:r>
-              <a:rPr lang="en-US" dirty="0" smtClean="0">
+              <a:rPr lang="en-US" dirty="0">
                 <a:solidFill>
                   <a:srgbClr val="FFFFFF"/>
                 </a:solidFill>
@@ -10914,7 +11040,7 @@
               <a:t></a:t>
             </a:r>
             <a:r>
-              <a:rPr lang="en-US" dirty="0" smtClean="0">
+              <a:rPr lang="en-US" dirty="0">
                 <a:solidFill>
                   <a:srgbClr val="FFFFFF"/>
                 </a:solidFill>
@@ -10922,7 +11048,7 @@
               <a:t> Setting up a template for the site (&lt;header&gt;,&lt;</a:t>
             </a:r>
             <a:r>
-              <a:rPr lang="en-US" dirty="0" err="1" smtClean="0">
+              <a:rPr lang="en-US" dirty="0" err="1">
                 <a:solidFill>
                   <a:srgbClr val="FFFFFF"/>
                 </a:solidFill>
@@ -10930,7 +11056,7 @@
               <a:t>nav</a:t>
             </a:r>
             <a:r>
-              <a:rPr lang="en-US" dirty="0" smtClean="0">
+              <a:rPr lang="en-US" dirty="0">
                 <a:solidFill>
                   <a:srgbClr val="FFFFFF"/>
                 </a:solidFill>
@@ -10956,7 +11082,7 @@
               <a:tabLst/>
             </a:pPr>
             <a:r>
-              <a:rPr lang="en-US" dirty="0" smtClean="0">
+              <a:rPr lang="en-US" dirty="0">
                 <a:solidFill>
                   <a:srgbClr val="FFFFFF"/>
                 </a:solidFill>
@@ -10983,7 +11109,7 @@
               <a:tabLst/>
             </a:pPr>
             <a:r>
-              <a:rPr lang="en-US" dirty="0" smtClean="0">
+              <a:rPr lang="en-US" dirty="0">
                 <a:solidFill>
                   <a:srgbClr val="FFFFFF"/>
                 </a:solidFill>
@@ -11010,7 +11136,7 @@
               <a:tabLst/>
             </a:pPr>
             <a:r>
-              <a:rPr lang="en-US" dirty="0" smtClean="0">
+              <a:rPr lang="en-US" dirty="0">
                 <a:solidFill>
                   <a:srgbClr val="FFFFFF"/>
                 </a:solidFill>
@@ -11036,7 +11162,7 @@
               <a:buChar char="•"/>
               <a:tabLst/>
             </a:pPr>
-            <a:endParaRPr lang="en-US" dirty="0" smtClean="0">
+            <a:endParaRPr lang="en-US" dirty="0">
               <a:solidFill>
                 <a:srgbClr val="FFFFFF"/>
               </a:solidFill>
@@ -11101,7 +11227,7 @@
           </a:ln>
           <a:extLst>
             <a:ext uri="{C572A759-6A51-4108-AA02-DFA0A04FC94B}">
-              <ma14:wrappingTextBoxFlag xmlns:ma14="http://schemas.microsoft.com/office/mac/drawingml/2011/main" xmlns="" val="1"/>
+              <ma14:wrappingTextBoxFlag xmlns="" xmlns:ma14="http://schemas.microsoft.com/office/mac/drawingml/2011/main" val="1"/>
             </a:ext>
           </a:extLst>
         </p:spPr>
@@ -11120,18 +11246,13 @@
               </a:defRPr>
             </a:pPr>
             <a:r>
-              <a:rPr dirty="0" smtClean="0">
+              <a:rPr dirty="0">
                 <a:solidFill>
                   <a:srgbClr val="FFFFFF"/>
                 </a:solidFill>
               </a:rPr>
               <a:t>Demo</a:t>
             </a:r>
-            <a:endParaRPr dirty="0">
-              <a:solidFill>
-                <a:srgbClr val="FFFFFF"/>
-              </a:solidFill>
-            </a:endParaRPr>
           </a:p>
         </p:txBody>
       </p:sp>
@@ -11462,7 +11583,7 @@
               <a:tabLst/>
             </a:pPr>
             <a:r>
-              <a:rPr kumimoji="0" lang="da-DK" sz="2000" b="0" i="0" u="none" strike="noStrike" cap="none" spc="0" normalizeH="0" baseline="0" dirty="0" smtClean="0">
+              <a:rPr kumimoji="0" lang="da-DK" sz="2000" b="0" i="0" u="none" strike="noStrike" cap="none" spc="0" normalizeH="0" baseline="0" dirty="0">
                 <a:ln>
                   <a:noFill/>
                 </a:ln>
@@ -11479,7 +11600,7 @@
               <a:t>Emanuel</a:t>
             </a:r>
             <a:r>
-              <a:rPr kumimoji="0" lang="da-DK" sz="2000" b="0" i="0" u="none" strike="noStrike" cap="none" spc="0" normalizeH="0" dirty="0" smtClean="0">
+              <a:rPr kumimoji="0" lang="da-DK" sz="2000" b="0" i="0" u="none" strike="noStrike" cap="none" spc="0" normalizeH="0" dirty="0">
                 <a:ln>
                   <a:noFill/>
                 </a:ln>
@@ -11496,6 +11617,71 @@
               <a:t> &amp; Peter</a:t>
             </a:r>
             <a:endParaRPr kumimoji="0" lang="da-DK" sz="2000" b="0" i="0" u="none" strike="noStrike" cap="none" spc="0" normalizeH="0" baseline="0" dirty="0">
+              <a:ln>
+                <a:noFill/>
+              </a:ln>
+              <a:solidFill>
+                <a:srgbClr val="4E5755"/>
+              </a:solidFill>
+              <a:effectLst/>
+              <a:uFillTx/>
+              <a:latin typeface="+mn-lt"/>
+              <a:ea typeface="+mn-ea"/>
+              <a:cs typeface="+mn-cs"/>
+              <a:sym typeface="Avenir Book"/>
+            </a:endParaRPr>
+          </a:p>
+        </p:txBody>
+      </p:sp>
+      <p:sp>
+        <p:nvSpPr>
+          <p:cNvPr id="8" name="Tekstfelt 7"/>
+          <p:cNvSpPr txBox="1"/>
+          <p:nvPr/>
+        </p:nvSpPr>
+        <p:spPr>
+          <a:xfrm>
+            <a:off x="2580362" y="8510358"/>
+            <a:ext cx="8017788" cy="687368"/>
+          </a:xfrm>
+          <a:prstGeom prst="rect">
+            <a:avLst/>
+          </a:prstGeom>
+          <a:noFill/>
+          <a:ln w="12700" cap="flat">
+            <a:noFill/>
+            <a:miter lim="400000"/>
+          </a:ln>
+          <a:effectLst/>
+          <a:sp3d/>
+        </p:spPr>
+        <p:style>
+          <a:lnRef idx="0">
+            <a:scrgbClr r="0" g="0" b="0"/>
+          </a:lnRef>
+          <a:fillRef idx="0">
+            <a:scrgbClr r="0" g="0" b="0"/>
+          </a:fillRef>
+          <a:effectRef idx="0">
+            <a:scrgbClr r="0" g="0" b="0"/>
+          </a:effectRef>
+          <a:fontRef idx="none"/>
+        </p:style>
+        <p:txBody>
+          <a:bodyPr rot="0" spcFirstLastPara="1" vertOverflow="overflow" horzOverflow="overflow" vert="horz" wrap="square" lIns="50800" tIns="50800" rIns="50800" bIns="50800" numCol="1" spcCol="38100" rtlCol="0" anchor="ctr">
+            <a:spAutoFit/>
+          </a:bodyPr>
+          <a:lstStyle/>
+          <a:p>
+            <a:r>
+              <a:rPr lang="da-DK" dirty="0">
+                <a:solidFill>
+                  <a:srgbClr val="FFFFFF"/>
+                </a:solidFill>
+              </a:rPr>
+              <a:t>https://github.com/Pederytter/vleminck</a:t>
+            </a:r>
+            <a:endParaRPr kumimoji="0" lang="da-DK" sz="3800" b="0" i="0" u="none" strike="noStrike" cap="none" spc="0" normalizeH="0" baseline="0" dirty="0">
               <a:ln>
                 <a:noFill/>
               </a:ln>

</xml_diff>